<commit_message>
Minor changes in images
</commit_message>
<xml_diff>
--- a/images/HasNext.pptx
+++ b/images/HasNext.pptx
@@ -104,6 +104,22 @@
       </a:defRPr>
     </a:lvl9pPr>
   </p:defaultTextStyle>
+  <p:extLst>
+    <p:ext uri="{EFAFB233-063F-42B5-8137-9DF3F51BA10A}">
+      <p15:sldGuideLst xmlns:p15="http://schemas.microsoft.com/office/powerpoint/2012/main">
+        <p15:guide id="1" orient="horz" pos="2160">
+          <p15:clr>
+            <a:srgbClr val="A4A3A4"/>
+          </p15:clr>
+        </p15:guide>
+        <p15:guide id="2" pos="2880">
+          <p15:clr>
+            <a:srgbClr val="A4A3A4"/>
+          </p15:clr>
+        </p15:guide>
+      </p15:sldGuideLst>
+    </p:ext>
+  </p:extLst>
 </p:presentation>
 </file>
 
@@ -288,7 +304,7 @@
           <a:p>
             <a:fld id="{368186EF-EC2B-1F43-AABB-F71AC253CFEE}" type="datetimeFigureOut">
               <a:rPr lang="en-US" smtClean="0"/>
-              <a:t>20/02/15</a:t>
+              <a:t>3/11/2016</a:t>
             </a:fld>
             <a:endParaRPr lang="en-US"/>
           </a:p>
@@ -458,7 +474,7 @@
           <a:p>
             <a:fld id="{368186EF-EC2B-1F43-AABB-F71AC253CFEE}" type="datetimeFigureOut">
               <a:rPr lang="en-US" smtClean="0"/>
-              <a:t>20/02/15</a:t>
+              <a:t>3/11/2016</a:t>
             </a:fld>
             <a:endParaRPr lang="en-US"/>
           </a:p>
@@ -638,7 +654,7 @@
           <a:p>
             <a:fld id="{368186EF-EC2B-1F43-AABB-F71AC253CFEE}" type="datetimeFigureOut">
               <a:rPr lang="en-US" smtClean="0"/>
-              <a:t>20/02/15</a:t>
+              <a:t>3/11/2016</a:t>
             </a:fld>
             <a:endParaRPr lang="en-US"/>
           </a:p>
@@ -808,7 +824,7 @@
           <a:p>
             <a:fld id="{368186EF-EC2B-1F43-AABB-F71AC253CFEE}" type="datetimeFigureOut">
               <a:rPr lang="en-US" smtClean="0"/>
-              <a:t>20/02/15</a:t>
+              <a:t>3/11/2016</a:t>
             </a:fld>
             <a:endParaRPr lang="en-US"/>
           </a:p>
@@ -1054,7 +1070,7 @@
           <a:p>
             <a:fld id="{368186EF-EC2B-1F43-AABB-F71AC253CFEE}" type="datetimeFigureOut">
               <a:rPr lang="en-US" smtClean="0"/>
-              <a:t>20/02/15</a:t>
+              <a:t>3/11/2016</a:t>
             </a:fld>
             <a:endParaRPr lang="en-US"/>
           </a:p>
@@ -1342,7 +1358,7 @@
           <a:p>
             <a:fld id="{368186EF-EC2B-1F43-AABB-F71AC253CFEE}" type="datetimeFigureOut">
               <a:rPr lang="en-US" smtClean="0"/>
-              <a:t>20/02/15</a:t>
+              <a:t>3/11/2016</a:t>
             </a:fld>
             <a:endParaRPr lang="en-US"/>
           </a:p>
@@ -1764,7 +1780,7 @@
           <a:p>
             <a:fld id="{368186EF-EC2B-1F43-AABB-F71AC253CFEE}" type="datetimeFigureOut">
               <a:rPr lang="en-US" smtClean="0"/>
-              <a:t>20/02/15</a:t>
+              <a:t>3/11/2016</a:t>
             </a:fld>
             <a:endParaRPr lang="en-US"/>
           </a:p>
@@ -1882,7 +1898,7 @@
           <a:p>
             <a:fld id="{368186EF-EC2B-1F43-AABB-F71AC253CFEE}" type="datetimeFigureOut">
               <a:rPr lang="en-US" smtClean="0"/>
-              <a:t>20/02/15</a:t>
+              <a:t>3/11/2016</a:t>
             </a:fld>
             <a:endParaRPr lang="en-US"/>
           </a:p>
@@ -1977,7 +1993,7 @@
           <a:p>
             <a:fld id="{368186EF-EC2B-1F43-AABB-F71AC253CFEE}" type="datetimeFigureOut">
               <a:rPr lang="en-US" smtClean="0"/>
-              <a:t>20/02/15</a:t>
+              <a:t>3/11/2016</a:t>
             </a:fld>
             <a:endParaRPr lang="en-US"/>
           </a:p>
@@ -2254,7 +2270,7 @@
           <a:p>
             <a:fld id="{368186EF-EC2B-1F43-AABB-F71AC253CFEE}" type="datetimeFigureOut">
               <a:rPr lang="en-US" smtClean="0"/>
-              <a:t>20/02/15</a:t>
+              <a:t>3/11/2016</a:t>
             </a:fld>
             <a:endParaRPr lang="en-US"/>
           </a:p>
@@ -2507,7 +2523,7 @@
           <a:p>
             <a:fld id="{368186EF-EC2B-1F43-AABB-F71AC253CFEE}" type="datetimeFigureOut">
               <a:rPr lang="en-US" smtClean="0"/>
-              <a:t>20/02/15</a:t>
+              <a:t>3/11/2016</a:t>
             </a:fld>
             <a:endParaRPr lang="en-US"/>
           </a:p>
@@ -2720,7 +2736,7 @@
           <a:p>
             <a:fld id="{368186EF-EC2B-1F43-AABB-F71AC253CFEE}" type="datetimeFigureOut">
               <a:rPr lang="en-US" smtClean="0"/>
-              <a:t>20/02/15</a:t>
+              <a:t>3/11/2016</a:t>
             </a:fld>
             <a:endParaRPr lang="en-US"/>
           </a:p>
@@ -3103,10 +3119,10 @@
         </p:nvGrpSpPr>
         <p:grpSpPr>
           <a:xfrm>
-            <a:off x="455877" y="553543"/>
-            <a:ext cx="8279534" cy="5991065"/>
-            <a:chOff x="2491042" y="2745749"/>
-            <a:chExt cx="3064079" cy="2052214"/>
+            <a:off x="740230" y="672701"/>
+            <a:ext cx="7995181" cy="5871907"/>
+            <a:chOff x="2596275" y="2786566"/>
+            <a:chExt cx="2958846" cy="2011397"/>
           </a:xfrm>
         </p:grpSpPr>
         <p:sp>
@@ -3199,8 +3215,8 @@
           </p:nvCxnSpPr>
           <p:spPr bwMode="auto">
             <a:xfrm flipV="1">
-              <a:off x="2491042" y="3349984"/>
-              <a:ext cx="288955" cy="6382"/>
+              <a:off x="2596275" y="3349984"/>
+              <a:ext cx="183722" cy="4057"/>
             </a:xfrm>
             <a:prstGeom prst="straightConnector1">
               <a:avLst/>
@@ -3617,8 +3633,8 @@
           </p:nvCxnSpPr>
           <p:spPr bwMode="auto">
             <a:xfrm flipV="1">
-              <a:off x="5071712" y="3037321"/>
-              <a:ext cx="89147" cy="98176"/>
+              <a:off x="5095306" y="3071641"/>
+              <a:ext cx="41738" cy="55657"/>
             </a:xfrm>
             <a:prstGeom prst="straightConnector1">
               <a:avLst/>
@@ -3644,8 +3660,8 @@
           </p:nvCxnSpPr>
           <p:spPr bwMode="auto">
             <a:xfrm flipH="1" flipV="1">
-              <a:off x="5009244" y="3076717"/>
-              <a:ext cx="91750" cy="48776"/>
+              <a:off x="5033079" y="3099469"/>
+              <a:ext cx="67915" cy="26024"/>
             </a:xfrm>
             <a:prstGeom prst="straightConnector1">
               <a:avLst/>
@@ -3711,8 +3727,8 @@
               </a:pPr>
               <a:r>
                 <a:rPr lang="en-IN" sz="3600" dirty="0" smtClean="0">
-                  <a:latin typeface="Calibri" pitchFamily="34" charset="0"/>
-                  <a:cs typeface="Arial" pitchFamily="34" charset="0"/>
+                  <a:latin typeface="Consolas" panose="020B0609020204030204" pitchFamily="49" charset="0"/>
+                  <a:cs typeface="Consolas" panose="020B0609020204030204" pitchFamily="49" charset="0"/>
                 </a:rPr>
                 <a:t>hasNext</a:t>
               </a:r>
@@ -3724,8 +3740,8 @@
                   <a:schemeClr val="tx1"/>
                 </a:solidFill>
                 <a:effectLst/>
-                <a:latin typeface="Arial" pitchFamily="34" charset="0"/>
-                <a:cs typeface="Arial" pitchFamily="34" charset="0"/>
+                <a:latin typeface="Consolas" panose="020B0609020204030204" pitchFamily="49" charset="0"/>
+                <a:cs typeface="Consolas" panose="020B0609020204030204" pitchFamily="49" charset="0"/>
               </a:endParaRPr>
             </a:p>
           </p:txBody>
@@ -3740,7 +3756,7 @@
           </p:nvSpPr>
           <p:spPr bwMode="auto">
             <a:xfrm>
-              <a:off x="4556230" y="2745749"/>
+              <a:off x="4556230" y="2795420"/>
               <a:ext cx="791868" cy="285075"/>
             </a:xfrm>
             <a:prstGeom prst="rect">
@@ -3787,8 +3803,8 @@
                     <a:schemeClr val="tx1"/>
                   </a:solidFill>
                   <a:effectLst/>
-                  <a:latin typeface="Calibri" pitchFamily="34" charset="0"/>
-                  <a:cs typeface="Arial" pitchFamily="34" charset="0"/>
+                  <a:latin typeface="Consolas" panose="020B0609020204030204" pitchFamily="49" charset="0"/>
+                  <a:cs typeface="Consolas" panose="020B0609020204030204" pitchFamily="49" charset="0"/>
                 </a:rPr>
                 <a:t>hasNext</a:t>
               </a:r>
@@ -3800,8 +3816,8 @@
                   <a:schemeClr val="tx1"/>
                 </a:solidFill>
                 <a:effectLst/>
-                <a:latin typeface="Arial" pitchFamily="34" charset="0"/>
-                <a:cs typeface="Arial" pitchFamily="34" charset="0"/>
+                <a:latin typeface="Consolas" panose="020B0609020204030204" pitchFamily="49" charset="0"/>
+                <a:cs typeface="Consolas" panose="020B0609020204030204" pitchFamily="49" charset="0"/>
               </a:endParaRPr>
             </a:p>
           </p:txBody>
@@ -3892,8 +3908,8 @@
           </p:nvCxnSpPr>
           <p:spPr bwMode="auto">
             <a:xfrm flipV="1">
-              <a:off x="3906873" y="4257057"/>
-              <a:ext cx="89147" cy="98176"/>
+              <a:off x="3923105" y="4314688"/>
+              <a:ext cx="36146" cy="54997"/>
             </a:xfrm>
             <a:prstGeom prst="straightConnector1">
               <a:avLst/>
@@ -3919,8 +3935,8 @@
           </p:nvCxnSpPr>
           <p:spPr bwMode="auto">
             <a:xfrm flipH="1" flipV="1">
-              <a:off x="3808922" y="4314688"/>
-              <a:ext cx="91750" cy="48776"/>
+              <a:off x="3861133" y="4345853"/>
+              <a:ext cx="59598" cy="24389"/>
             </a:xfrm>
             <a:prstGeom prst="straightConnector1">
               <a:avLst/>

</xml_diff>